<commit_message>
Ajustes en scripts presentación
Se agregan brechas y descomposiciones de varianza
</commit_message>
<xml_diff>
--- a/src/presentacion/referencia.pptx
+++ b/src/presentacion/referencia.pptx
@@ -106,6 +106,11 @@
       </a:defRPr>
     </a:lvl9pPr>
   </p:defaultTextStyle>
+  <p:extLst>
+    <p:ext uri="{EFAFB233-063F-42B5-8137-9DF3F51BA10A}">
+      <p15:sldGuideLst xmlns:p15="http://schemas.microsoft.com/office/powerpoint/2012/main"/>
+    </p:ext>
+  </p:extLst>
 </p:presentation>
 </file>
 
@@ -335,7 +340,7 @@
           <a:p>
             <a:fld id="{A835D8CB-5FF3-4318-8284-98756728AB53}" type="datetimeFigureOut">
               <a:rPr lang="es-GT" smtClean="0"/>
-              <a:t>12/03/2024</a:t>
+              <a:t>14/03/2024</a:t>
             </a:fld>
             <a:endParaRPr lang="es-GT"/>
           </a:p>
@@ -543,7 +548,7 @@
           <a:p>
             <a:fld id="{A835D8CB-5FF3-4318-8284-98756728AB53}" type="datetimeFigureOut">
               <a:rPr lang="es-GT" smtClean="0"/>
-              <a:t>12/03/2024</a:t>
+              <a:t>14/03/2024</a:t>
             </a:fld>
             <a:endParaRPr lang="es-GT"/>
           </a:p>
@@ -799,7 +804,7 @@
           <a:p>
             <a:fld id="{A835D8CB-5FF3-4318-8284-98756728AB53}" type="datetimeFigureOut">
               <a:rPr lang="es-GT" smtClean="0"/>
-              <a:t>12/03/2024</a:t>
+              <a:t>14/03/2024</a:t>
             </a:fld>
             <a:endParaRPr lang="es-GT"/>
           </a:p>
@@ -973,7 +978,7 @@
           <a:p>
             <a:fld id="{A835D8CB-5FF3-4318-8284-98756728AB53}" type="datetimeFigureOut">
               <a:rPr lang="es-GT" smtClean="0"/>
-              <a:t>12/03/2024</a:t>
+              <a:t>14/03/2024</a:t>
             </a:fld>
             <a:endParaRPr lang="es-GT"/>
           </a:p>
@@ -1316,7 +1321,7 @@
           <a:p>
             <a:fld id="{A835D8CB-5FF3-4318-8284-98756728AB53}" type="datetimeFigureOut">
               <a:rPr lang="es-GT" smtClean="0"/>
-              <a:t>12/03/2024</a:t>
+              <a:t>14/03/2024</a:t>
             </a:fld>
             <a:endParaRPr lang="es-GT"/>
           </a:p>
@@ -1591,7 +1596,7 @@
           <a:p>
             <a:fld id="{A835D8CB-5FF3-4318-8284-98756728AB53}" type="datetimeFigureOut">
               <a:rPr lang="es-GT" smtClean="0"/>
-              <a:t>12/03/2024</a:t>
+              <a:t>14/03/2024</a:t>
             </a:fld>
             <a:endParaRPr lang="es-GT"/>
           </a:p>
@@ -1970,7 +1975,7 @@
           <a:p>
             <a:fld id="{A835D8CB-5FF3-4318-8284-98756728AB53}" type="datetimeFigureOut">
               <a:rPr lang="es-GT" smtClean="0"/>
-              <a:t>12/03/2024</a:t>
+              <a:t>14/03/2024</a:t>
             </a:fld>
             <a:endParaRPr lang="es-GT"/>
           </a:p>
@@ -2088,7 +2093,7 @@
           <a:p>
             <a:fld id="{A835D8CB-5FF3-4318-8284-98756728AB53}" type="datetimeFigureOut">
               <a:rPr lang="es-GT" smtClean="0"/>
-              <a:t>12/03/2024</a:t>
+              <a:t>14/03/2024</a:t>
             </a:fld>
             <a:endParaRPr lang="es-GT"/>
           </a:p>
@@ -2259,7 +2264,7 @@
           <a:p>
             <a:fld id="{A835D8CB-5FF3-4318-8284-98756728AB53}" type="datetimeFigureOut">
               <a:rPr lang="es-GT" smtClean="0"/>
-              <a:t>12/03/2024</a:t>
+              <a:t>14/03/2024</a:t>
             </a:fld>
             <a:endParaRPr lang="es-GT"/>
           </a:p>
@@ -2613,7 +2618,7 @@
           <a:p>
             <a:fld id="{A835D8CB-5FF3-4318-8284-98756728AB53}" type="datetimeFigureOut">
               <a:rPr lang="es-GT" smtClean="0"/>
-              <a:t>12/03/2024</a:t>
+              <a:t>14/03/2024</a:t>
             </a:fld>
             <a:endParaRPr lang="es-GT"/>
           </a:p>
@@ -2995,7 +3000,7 @@
           <a:p>
             <a:fld id="{A835D8CB-5FF3-4318-8284-98756728AB53}" type="datetimeFigureOut">
               <a:rPr lang="es-GT" smtClean="0"/>
-              <a:t>12/03/2024</a:t>
+              <a:t>14/03/2024</a:t>
             </a:fld>
             <a:endParaRPr lang="es-GT"/>
           </a:p>
@@ -3282,7 +3287,7 @@
           <a:p>
             <a:fld id="{A835D8CB-5FF3-4318-8284-98756728AB53}" type="datetimeFigureOut">
               <a:rPr lang="es-GT" smtClean="0"/>
-              <a:t>12/03/2024</a:t>
+              <a:t>14/03/2024</a:t>
             </a:fld>
             <a:endParaRPr lang="es-GT"/>
           </a:p>
@@ -4003,7 +4008,7 @@
         <p:spPr>
           <a:xfrm>
             <a:off x="1" y="0"/>
-            <a:ext cx="6096000" cy="6326155"/>
+            <a:ext cx="6096000" cy="3160433"/>
           </a:xfrm>
           <a:prstGeom prst="rect">
             <a:avLst/>
@@ -4076,6 +4081,42 @@
           <a:xfrm>
             <a:off x="6095998" y="3160433"/>
             <a:ext cx="6096001" cy="3164400"/>
+          </a:xfrm>
+          <a:prstGeom prst="rect">
+            <a:avLst/>
+          </a:prstGeom>
+        </p:spPr>
+      </p:pic>
+      <p:pic>
+        <p:nvPicPr>
+          <p:cNvPr id="3" name="Imagen 2">
+            <a:extLst>
+              <a:ext uri="{FF2B5EF4-FFF2-40B4-BE49-F238E27FC236}">
+                <a16:creationId xmlns:a16="http://schemas.microsoft.com/office/drawing/2014/main" id="{526D1F40-E955-4B5B-B13B-69CAAF14DC0E}"/>
+              </a:ext>
+            </a:extLst>
+          </p:cNvPr>
+          <p:cNvPicPr>
+            <a:picLocks noChangeAspect="1"/>
+          </p:cNvPicPr>
+          <p:nvPr/>
+        </p:nvPicPr>
+        <p:blipFill>
+          <a:blip r:embed="rId5">
+            <a:extLst>
+              <a:ext uri="{28A0092B-C50C-407E-A947-70E740481C1C}">
+                <a14:useLocalDpi xmlns:a14="http://schemas.microsoft.com/office/drawing/2010/main" val="0"/>
+              </a:ext>
+            </a:extLst>
+          </a:blip>
+          <a:stretch>
+            <a:fillRect/>
+          </a:stretch>
+        </p:blipFill>
+        <p:spPr>
+          <a:xfrm>
+            <a:off x="0" y="3160431"/>
+            <a:ext cx="6095997" cy="3164401"/>
           </a:xfrm>
           <a:prstGeom prst="rect">
             <a:avLst/>

</xml_diff>